<commit_message>
Added MDS to distances
</commit_message>
<xml_diff>
--- a/Final Report/Final Presentation.pptx
+++ b/Final Report/Final Presentation.pptx
@@ -12444,195 +12444,6 @@
       </p:sp>
       <p:sp>
         <p:nvSpPr>
-          <p:cNvPr id="3" name="Content Placeholder 2"/>
-          <p:cNvSpPr>
-            <a:spLocks noGrp="1"/>
-          </p:cNvSpPr>
-          <p:nvPr>
-            <p:ph idx="1"/>
-          </p:nvPr>
-        </p:nvSpPr>
-        <p:spPr>
-          <a:xfrm>
-            <a:off x="517586" y="1500996"/>
-            <a:ext cx="10632514" cy="4874403"/>
-          </a:xfrm>
-        </p:spPr>
-        <p:txBody>
-          <a:bodyPr>
-            <a:noAutofit/>
-          </a:bodyPr>
-          <a:lstStyle/>
-          <a:p>
-            <a:pPr algn="just">
-              <a:spcAft>
-                <a:spcPts val="2500"/>
-              </a:spcAft>
-              <a:buClr>
-                <a:schemeClr val="accent1">
-                  <a:lumMod val="75000"/>
-                </a:schemeClr>
-              </a:buClr>
-              <a:buSzPct val="75000"/>
-              <a:buFont typeface="Courier New" panose="02070309020205020404" pitchFamily="49" charset="0"/>
-              <a:buChar char="o"/>
-            </a:pPr>
-            <a:r>
-              <a:rPr lang="en-US" sz="2400" dirty="0">
-                <a:solidFill>
-                  <a:schemeClr val="bg1"/>
-                </a:solidFill>
-                <a:latin typeface="Calibri Light" panose="020F0302020204030204" pitchFamily="34" charset="0"/>
-                <a:cs typeface="Calibri Light" panose="020F0302020204030204" pitchFamily="34" charset="0"/>
-              </a:rPr>
-              <a:t>Implement chord-class (i.e. extract the set of all chords in the track) and chord-sequence embedding (i.e. extract the set of all sequences of chords of length N). </a:t>
-            </a:r>
-          </a:p>
-          <a:p>
-            <a:pPr algn="just">
-              <a:spcAft>
-                <a:spcPts val="2500"/>
-              </a:spcAft>
-              <a:buClr>
-                <a:schemeClr val="accent1">
-                  <a:lumMod val="75000"/>
-                </a:schemeClr>
-              </a:buClr>
-              <a:buSzPct val="75000"/>
-              <a:buFont typeface="Courier New" panose="02070309020205020404" pitchFamily="49" charset="0"/>
-              <a:buChar char="o"/>
-            </a:pPr>
-            <a:r>
-              <a:rPr lang="en-US" sz="2400" dirty="0">
-                <a:solidFill>
-                  <a:schemeClr val="bg1"/>
-                </a:solidFill>
-                <a:latin typeface="Calibri Light" panose="020F0302020204030204" pitchFamily="34" charset="0"/>
-                <a:cs typeface="Calibri Light" panose="020F0302020204030204" pitchFamily="34" charset="0"/>
-              </a:rPr>
-              <a:t>Formulating the distance measure for the above two embeddings. </a:t>
-            </a:r>
-          </a:p>
-          <a:p>
-            <a:pPr algn="just">
-              <a:spcAft>
-                <a:spcPts val="2500"/>
-              </a:spcAft>
-              <a:buClr>
-                <a:schemeClr val="accent1">
-                  <a:lumMod val="75000"/>
-                </a:schemeClr>
-              </a:buClr>
-              <a:buSzPct val="75000"/>
-              <a:buFont typeface="Courier New" panose="02070309020205020404" pitchFamily="49" charset="0"/>
-              <a:buChar char="o"/>
-            </a:pPr>
-            <a:r>
-              <a:rPr lang="en-US" sz="2400" dirty="0">
-                <a:solidFill>
-                  <a:schemeClr val="bg1"/>
-                </a:solidFill>
-                <a:latin typeface="Calibri Light" panose="020F0302020204030204" pitchFamily="34" charset="0"/>
-                <a:cs typeface="Calibri Light" panose="020F0302020204030204" pitchFamily="34" charset="0"/>
-              </a:rPr>
-              <a:t>Use machine learning algorithms along with neural networks for the artist and genre classification based on the songs.</a:t>
-            </a:r>
-          </a:p>
-          <a:p>
-            <a:pPr algn="just">
-              <a:spcAft>
-                <a:spcPts val="2500"/>
-              </a:spcAft>
-              <a:buClr>
-                <a:schemeClr val="accent1">
-                  <a:lumMod val="75000"/>
-                </a:schemeClr>
-              </a:buClr>
-              <a:buSzPct val="75000"/>
-              <a:buFont typeface="Courier New" panose="02070309020205020404" pitchFamily="49" charset="0"/>
-              <a:buChar char="o"/>
-            </a:pPr>
-            <a:r>
-              <a:rPr lang="en-US" sz="2400" dirty="0">
-                <a:solidFill>
-                  <a:schemeClr val="bg1"/>
-                </a:solidFill>
-                <a:latin typeface="Calibri Light" panose="020F0302020204030204" pitchFamily="34" charset="0"/>
-                <a:cs typeface="Calibri Light" panose="020F0302020204030204" pitchFamily="34" charset="0"/>
-              </a:rPr>
-              <a:t>Identifying the common chord progressions in popular music.</a:t>
-            </a:r>
-          </a:p>
-          <a:p>
-            <a:pPr algn="just">
-              <a:spcAft>
-                <a:spcPts val="2500"/>
-              </a:spcAft>
-              <a:buClr>
-                <a:schemeClr val="accent1">
-                  <a:lumMod val="75000"/>
-                </a:schemeClr>
-              </a:buClr>
-              <a:buSzPct val="75000"/>
-              <a:buFont typeface="Courier New" panose="02070309020205020404" pitchFamily="49" charset="0"/>
-              <a:buChar char="o"/>
-            </a:pPr>
-            <a:endParaRPr lang="en-US" sz="2400" dirty="0">
-              <a:solidFill>
-                <a:schemeClr val="bg1"/>
-              </a:solidFill>
-              <a:latin typeface="Calibri Light" panose="020F0302020204030204" pitchFamily="34" charset="0"/>
-              <a:cs typeface="Calibri Light" panose="020F0302020204030204" pitchFamily="34" charset="0"/>
-            </a:endParaRPr>
-          </a:p>
-          <a:p>
-            <a:pPr algn="just">
-              <a:spcAft>
-                <a:spcPts val="2500"/>
-              </a:spcAft>
-              <a:buClr>
-                <a:schemeClr val="accent1">
-                  <a:lumMod val="75000"/>
-                </a:schemeClr>
-              </a:buClr>
-              <a:buSzPct val="75000"/>
-              <a:buFont typeface="Courier New" panose="02070309020205020404" pitchFamily="49" charset="0"/>
-              <a:buChar char="o"/>
-            </a:pPr>
-            <a:endParaRPr lang="en-US" sz="2400" dirty="0">
-              <a:solidFill>
-                <a:schemeClr val="bg1"/>
-              </a:solidFill>
-              <a:latin typeface="Calibri Light" panose="020F0302020204030204" pitchFamily="34" charset="0"/>
-              <a:cs typeface="Calibri Light" panose="020F0302020204030204" pitchFamily="34" charset="0"/>
-            </a:endParaRPr>
-          </a:p>
-          <a:p>
-            <a:pPr algn="just">
-              <a:spcAft>
-                <a:spcPts val="2500"/>
-              </a:spcAft>
-              <a:buClr>
-                <a:schemeClr val="accent1">
-                  <a:lumMod val="75000"/>
-                </a:schemeClr>
-              </a:buClr>
-              <a:buSzPct val="75000"/>
-              <a:buFont typeface="Courier New" panose="02070309020205020404" pitchFamily="49" charset="0"/>
-              <a:buChar char="o"/>
-            </a:pPr>
-            <a:endParaRPr lang="en-US" sz="2400" dirty="0">
-              <a:solidFill>
-                <a:schemeClr val="bg1"/>
-              </a:solidFill>
-              <a:latin typeface="Calibri Light" panose="020F0302020204030204" pitchFamily="34" charset="0"/>
-              <a:cs typeface="Calibri Light" panose="020F0302020204030204" pitchFamily="34" charset="0"/>
-            </a:endParaRPr>
-          </a:p>
-        </p:txBody>
-      </p:sp>
-      <p:sp>
-        <p:nvSpPr>
           <p:cNvPr id="11" name="Title 1"/>
           <p:cNvSpPr txBox="1">
             <a:spLocks/>
@@ -12689,6 +12500,31 @@
               </a:rPr>
               <a:t>Future Scope of Research</a:t>
             </a:r>
+          </a:p>
+        </p:txBody>
+      </p:sp>
+      <p:sp>
+        <p:nvSpPr>
+          <p:cNvPr id="12" name="Content Placeholder 11">
+            <a:extLst>
+              <a:ext uri="{FF2B5EF4-FFF2-40B4-BE49-F238E27FC236}">
+                <a16:creationId xmlns:a16="http://schemas.microsoft.com/office/drawing/2014/main" id="{8FEA6372-2C86-4242-8E5A-E1F2286E3918}"/>
+              </a:ext>
+            </a:extLst>
+          </p:cNvPr>
+          <p:cNvSpPr>
+            <a:spLocks noGrp="1"/>
+          </p:cNvSpPr>
+          <p:nvPr>
+            <p:ph idx="1"/>
+          </p:nvPr>
+        </p:nvSpPr>
+        <p:spPr/>
+        <p:txBody>
+          <a:bodyPr/>
+          <a:lstStyle/>
+          <a:p>
+            <a:endParaRPr lang="en-US"/>
           </a:p>
         </p:txBody>
       </p:sp>
@@ -13034,8 +12870,8 @@
         </p:nvSpPr>
         <p:spPr>
           <a:xfrm>
-            <a:off x="517586" y="1500996"/>
-            <a:ext cx="10632514" cy="4874403"/>
+            <a:off x="517586" y="1500997"/>
+            <a:ext cx="10632514" cy="4870928"/>
           </a:xfrm>
         </p:spPr>
         <p:txBody>

</xml_diff>